<commit_message>
updated intro deck for AU trainings
</commit_message>
<xml_diff>
--- a/Day 1/0. Training Intro/Training Introduction.pptx
+++ b/Day 1/0. Training Intro/Training Introduction.pptx
@@ -5,7 +5,7 @@
     <p:sldMasterId id="2147483680" r:id="rId1"/>
   </p:sldMasterIdLst>
   <p:notesMasterIdLst>
-    <p:notesMasterId r:id="rId15"/>
+    <p:notesMasterId r:id="rId16"/>
   </p:notesMasterIdLst>
   <p:sldIdLst>
     <p:sldId id="263" r:id="rId2"/>
@@ -13,14 +13,15 @@
     <p:sldId id="264" r:id="rId4"/>
     <p:sldId id="265" r:id="rId5"/>
     <p:sldId id="275" r:id="rId6"/>
-    <p:sldId id="266" r:id="rId7"/>
-    <p:sldId id="258" r:id="rId8"/>
-    <p:sldId id="259" r:id="rId9"/>
-    <p:sldId id="274" r:id="rId10"/>
-    <p:sldId id="267" r:id="rId11"/>
-    <p:sldId id="260" r:id="rId12"/>
-    <p:sldId id="268" r:id="rId13"/>
-    <p:sldId id="269" r:id="rId14"/>
+    <p:sldId id="276" r:id="rId7"/>
+    <p:sldId id="266" r:id="rId8"/>
+    <p:sldId id="258" r:id="rId9"/>
+    <p:sldId id="259" r:id="rId10"/>
+    <p:sldId id="274" r:id="rId11"/>
+    <p:sldId id="267" r:id="rId12"/>
+    <p:sldId id="260" r:id="rId13"/>
+    <p:sldId id="268" r:id="rId14"/>
+    <p:sldId id="269" r:id="rId15"/>
   </p:sldIdLst>
   <p:sldSz cx="12192000" cy="6858000"/>
   <p:notesSz cx="6858000" cy="9144000"/>
@@ -209,7 +210,7 @@
           <a:p>
             <a:fld id="{2E5CA586-3557-4985-BCD4-35EF5AC8B4A4}" type="datetimeFigureOut">
               <a:rPr lang="en-US" smtClean="0"/>
-              <a:t>5/24/2014</a:t>
+              <a:t>5/5/2015</a:t>
             </a:fld>
             <a:endParaRPr lang="en-US"/>
           </a:p>
@@ -703,7 +704,7 @@
           <a:p>
             <a:fld id="{BC60BE34-BC89-4C98-A56B-79B7A098D024}" type="slidenum">
               <a:rPr lang="en-US" smtClean="0"/>
-              <a:t>10</a:t>
+              <a:t>11</a:t>
             </a:fld>
             <a:endParaRPr lang="en-US"/>
           </a:p>
@@ -855,7 +856,7 @@
           <a:p>
             <a:fld id="{BC60BE34-BC89-4C98-A56B-79B7A098D024}" type="slidenum">
               <a:rPr lang="en-US" smtClean="0"/>
-              <a:t>11</a:t>
+              <a:t>12</a:t>
             </a:fld>
             <a:endParaRPr lang="en-US"/>
           </a:p>
@@ -986,7 +987,7 @@
                 </a:solidFill>
               </a:rPr>
               <a:pPr/>
-              <a:t>12</a:t>
+              <a:t>13</a:t>
             </a:fld>
             <a:endParaRPr lang="en-US">
               <a:solidFill>
@@ -1086,7 +1087,7 @@
                 </a:solidFill>
               </a:rPr>
               <a:pPr/>
-              <a:t>5/24/2014</a:t>
+              <a:t>5/5/2015</a:t>
             </a:fld>
             <a:endParaRPr lang="en-US" dirty="0">
               <a:solidFill>
@@ -1178,7 +1179,7 @@
                 </a:solidFill>
               </a:rPr>
               <a:pPr/>
-              <a:t>13</a:t>
+              <a:t>14</a:t>
             </a:fld>
             <a:endParaRPr lang="en-US" dirty="0">
               <a:solidFill>
@@ -1998,7 +1999,7 @@
           <a:p>
             <a:fld id="{BC60BE34-BC89-4C98-A56B-79B7A098D024}" type="slidenum">
               <a:rPr lang="en-US" smtClean="0"/>
-              <a:t>6</a:t>
+              <a:t>7</a:t>
             </a:fld>
             <a:endParaRPr lang="en-US"/>
           </a:p>
@@ -2105,7 +2106,7 @@
           <a:p>
             <a:fld id="{BC60BE34-BC89-4C98-A56B-79B7A098D024}" type="slidenum">
               <a:rPr lang="en-US" smtClean="0"/>
-              <a:t>7</a:t>
+              <a:t>8</a:t>
             </a:fld>
             <a:endParaRPr lang="en-US"/>
           </a:p>
@@ -2206,7 +2207,7 @@
           <a:p>
             <a:fld id="{BC60BE34-BC89-4C98-A56B-79B7A098D024}" type="slidenum">
               <a:rPr lang="en-US" smtClean="0"/>
-              <a:t>8</a:t>
+              <a:t>9</a:t>
             </a:fld>
             <a:endParaRPr lang="en-US"/>
           </a:p>
@@ -2290,7 +2291,7 @@
           <a:p>
             <a:fld id="{BC60BE34-BC89-4C98-A56B-79B7A098D024}" type="slidenum">
               <a:rPr lang="en-US" smtClean="0"/>
-              <a:t>9</a:t>
+              <a:t>10</a:t>
             </a:fld>
             <a:endParaRPr lang="en-US"/>
           </a:p>
@@ -12778,6 +12779,114 @@
           <a:chExt cx="0" cy="0"/>
         </a:xfrm>
       </p:grpSpPr>
+      <p:sp>
+        <p:nvSpPr>
+          <p:cNvPr id="5" name="Oval 4"/>
+          <p:cNvSpPr/>
+          <p:nvPr/>
+        </p:nvSpPr>
+        <p:spPr>
+          <a:xfrm>
+            <a:off x="8380614" y="2752725"/>
+            <a:ext cx="2068312" cy="433364"/>
+          </a:xfrm>
+          <a:prstGeom prst="ellipse">
+            <a:avLst/>
+          </a:prstGeom>
+          <a:noFill/>
+          <a:ln w="38100">
+            <a:solidFill>
+              <a:srgbClr val="C00000"/>
+            </a:solidFill>
+          </a:ln>
+        </p:spPr>
+        <p:style>
+          <a:lnRef idx="2">
+            <a:schemeClr val="accent2"/>
+          </a:lnRef>
+          <a:fillRef idx="1">
+            <a:schemeClr val="lt1"/>
+          </a:fillRef>
+          <a:effectRef idx="0">
+            <a:schemeClr val="accent2"/>
+          </a:effectRef>
+          <a:fontRef idx="minor">
+            <a:schemeClr val="dk1"/>
+          </a:fontRef>
+        </p:style>
+        <p:txBody>
+          <a:bodyPr rtlCol="0" anchor="ctr"/>
+          <a:lstStyle/>
+          <a:p>
+            <a:pPr algn="ctr"/>
+            <a:endParaRPr lang="en-US"/>
+          </a:p>
+        </p:txBody>
+      </p:sp>
+      <p:pic>
+        <p:nvPicPr>
+          <p:cNvPr id="4" name="图片 3"/>
+          <p:cNvPicPr>
+            <a:picLocks noChangeAspect="1"/>
+          </p:cNvPicPr>
+          <p:nvPr/>
+        </p:nvPicPr>
+        <p:blipFill>
+          <a:blip r:embed="rId3"/>
+          <a:stretch>
+            <a:fillRect/>
+          </a:stretch>
+        </p:blipFill>
+        <p:spPr>
+          <a:xfrm>
+            <a:off x="1619250" y="395287"/>
+            <a:ext cx="8953500" cy="6067425"/>
+          </a:xfrm>
+          <a:prstGeom prst="rect">
+            <a:avLst/>
+          </a:prstGeom>
+        </p:spPr>
+      </p:pic>
+    </p:spTree>
+    <p:extLst>
+      <p:ext uri="{BB962C8B-B14F-4D97-AF65-F5344CB8AC3E}">
+        <p14:creationId xmlns:p14="http://schemas.microsoft.com/office/powerpoint/2010/main" val="2120446934"/>
+      </p:ext>
+    </p:extLst>
+  </p:cSld>
+  <p:clrMapOvr>
+    <a:masterClrMapping/>
+  </p:clrMapOvr>
+  <p:transition>
+    <p:fade/>
+  </p:transition>
+  <p:timing>
+    <p:tnLst>
+      <p:par>
+        <p:cTn id="1" dur="indefinite" restart="never" nodeType="tmRoot"/>
+      </p:par>
+    </p:tnLst>
+  </p:timing>
+</p:sld>
+</file>
+
+<file path=ppt/slides/slide11.xml><?xml version="1.0" encoding="utf-8"?>
+<p:sld xmlns:a="http://schemas.openxmlformats.org/drawingml/2006/main" xmlns:r="http://schemas.openxmlformats.org/officeDocument/2006/relationships" xmlns:p="http://schemas.openxmlformats.org/presentationml/2006/main">
+  <p:cSld>
+    <p:spTree>
+      <p:nvGrpSpPr>
+        <p:cNvPr id="1" name=""/>
+        <p:cNvGrpSpPr/>
+        <p:nvPr/>
+      </p:nvGrpSpPr>
+      <p:grpSpPr>
+        <a:xfrm>
+          <a:off x="0" y="0"/>
+          <a:ext cx="0" cy="0"/>
+          <a:chOff x="0" y="0"/>
+          <a:chExt cx="0" cy="0"/>
+        </a:xfrm>
+      </p:grpSpPr>
       <p:pic>
         <p:nvPicPr>
           <p:cNvPr id="4" name="Picture 3"/>
@@ -12879,7 +12988,7 @@
 </p:sld>
 </file>
 
-<file path=ppt/slides/slide11.xml><?xml version="1.0" encoding="utf-8"?>
+<file path=ppt/slides/slide12.xml><?xml version="1.0" encoding="utf-8"?>
 <p:sld xmlns:a="http://schemas.openxmlformats.org/drawingml/2006/main" xmlns:r="http://schemas.openxmlformats.org/officeDocument/2006/relationships" xmlns:p="http://schemas.openxmlformats.org/presentationml/2006/main">
   <p:cSld>
     <p:spTree>
@@ -12943,7 +13052,7 @@
 </p:sld>
 </file>
 
-<file path=ppt/slides/slide12.xml><?xml version="1.0" encoding="utf-8"?>
+<file path=ppt/slides/slide13.xml><?xml version="1.0" encoding="utf-8"?>
 <p:sld xmlns:a="http://schemas.openxmlformats.org/drawingml/2006/main" xmlns:r="http://schemas.openxmlformats.org/officeDocument/2006/relationships" xmlns:p="http://schemas.openxmlformats.org/presentationml/2006/main">
   <p:cSld>
     <p:spTree>
@@ -13015,7 +13124,7 @@
 </p:sld>
 </file>
 
-<file path=ppt/slides/slide13.xml><?xml version="1.0" encoding="utf-8"?>
+<file path=ppt/slides/slide14.xml><?xml version="1.0" encoding="utf-8"?>
 <p:sld xmlns:a="http://schemas.openxmlformats.org/drawingml/2006/main" xmlns:r="http://schemas.openxmlformats.org/officeDocument/2006/relationships" xmlns:p="http://schemas.openxmlformats.org/presentationml/2006/main">
   <p:cSld>
     <p:spTree>
@@ -14275,6 +14384,172 @@
             <p:ph type="title"/>
           </p:nvPr>
         </p:nvSpPr>
+        <p:spPr/>
+        <p:txBody>
+          <a:bodyPr/>
+          <a:lstStyle/>
+          <a:p>
+            <a:r>
+              <a:rPr lang="en-US" dirty="0" smtClean="0"/>
+              <a:t>Azure Training Pass</a:t>
+            </a:r>
+            <a:endParaRPr lang="en-US" dirty="0"/>
+          </a:p>
+        </p:txBody>
+      </p:sp>
+      <p:sp>
+        <p:nvSpPr>
+          <p:cNvPr id="3" name="Text Placeholder 2"/>
+          <p:cNvSpPr>
+            <a:spLocks noGrp="1"/>
+          </p:cNvSpPr>
+          <p:nvPr>
+            <p:ph type="body" sz="quarter" idx="10"/>
+          </p:nvPr>
+        </p:nvSpPr>
+        <p:spPr>
+          <a:xfrm>
+            <a:off x="519249" y="1447800"/>
+            <a:ext cx="11151917" cy="4454168"/>
+          </a:xfrm>
+        </p:spPr>
+        <p:txBody>
+          <a:bodyPr/>
+          <a:lstStyle/>
+          <a:p>
+            <a:r>
+              <a:rPr lang="en-US" dirty="0" smtClean="0"/>
+              <a:t>Free Azure </a:t>
+            </a:r>
+            <a:r>
+              <a:rPr lang="en-US" dirty="0"/>
+              <a:t>Pass </a:t>
+            </a:r>
+            <a:r>
+              <a:rPr lang="en-US" dirty="0">
+                <a:hlinkClick r:id="rId2"/>
+              </a:rPr>
+              <a:t>http://azure.microsoft.com/en-us/pricing/free-trial</a:t>
+            </a:r>
+            <a:r>
+              <a:rPr lang="en-US" dirty="0" smtClean="0">
+                <a:hlinkClick r:id="rId2"/>
+              </a:rPr>
+              <a:t>/</a:t>
+            </a:r>
+            <a:r>
+              <a:rPr lang="en-US" dirty="0" smtClean="0"/>
+              <a:t> </a:t>
+            </a:r>
+          </a:p>
+          <a:p>
+            <a:r>
+              <a:rPr lang="en-US" dirty="0" smtClean="0"/>
+              <a:t>- $200, 30 day pass</a:t>
+            </a:r>
+          </a:p>
+          <a:p>
+            <a:r>
+              <a:rPr lang="en-US" dirty="0" smtClean="0"/>
+              <a:t>To activate </a:t>
+            </a:r>
+          </a:p>
+          <a:p>
+            <a:pPr marL="574674" indent="-571500">
+              <a:buFontTx/>
+              <a:buChar char="-"/>
+            </a:pPr>
+            <a:r>
+              <a:rPr lang="en-US" dirty="0" smtClean="0"/>
+              <a:t>phone number</a:t>
+            </a:r>
+          </a:p>
+          <a:p>
+            <a:pPr marL="574674" indent="-571500">
+              <a:buFontTx/>
+              <a:buChar char="-"/>
+            </a:pPr>
+            <a:r>
+              <a:rPr lang="en-US" dirty="0" smtClean="0"/>
+              <a:t>a </a:t>
+            </a:r>
+            <a:r>
+              <a:rPr lang="en-US" dirty="0"/>
+              <a:t>credit </a:t>
+            </a:r>
+            <a:r>
+              <a:rPr lang="en-US" dirty="0" smtClean="0"/>
+              <a:t>card (does not get charged for $200 credit)</a:t>
+            </a:r>
+          </a:p>
+          <a:p>
+            <a:r>
+              <a:rPr lang="en-US" dirty="0" smtClean="0"/>
+              <a:t>-   Microsoft </a:t>
+            </a:r>
+            <a:r>
+              <a:rPr lang="en-US" dirty="0"/>
+              <a:t>Account </a:t>
+            </a:r>
+            <a:r>
+              <a:rPr lang="en-US" dirty="0" smtClean="0"/>
+              <a:t>username </a:t>
+            </a:r>
+            <a:r>
+              <a:rPr lang="en-US" sz="3200" dirty="0" smtClean="0"/>
+              <a:t>(formerly </a:t>
+            </a:r>
+            <a:r>
+              <a:rPr lang="en-US" sz="3200" dirty="0"/>
+              <a:t>Windows Live ID).</a:t>
+            </a:r>
+            <a:endParaRPr lang="en-US" dirty="0"/>
+          </a:p>
+        </p:txBody>
+      </p:sp>
+    </p:spTree>
+    <p:extLst>
+      <p:ext uri="{BB962C8B-B14F-4D97-AF65-F5344CB8AC3E}">
+        <p14:creationId xmlns:p14="http://schemas.microsoft.com/office/powerpoint/2010/main" val="3441233686"/>
+      </p:ext>
+    </p:extLst>
+  </p:cSld>
+  <p:clrMapOvr>
+    <a:masterClrMapping/>
+  </p:clrMapOvr>
+  <p:transition>
+    <p:fade/>
+  </p:transition>
+</p:sld>
+</file>
+
+<file path=ppt/slides/slide7.xml><?xml version="1.0" encoding="utf-8"?>
+<p:sld xmlns:a="http://schemas.openxmlformats.org/drawingml/2006/main" xmlns:r="http://schemas.openxmlformats.org/officeDocument/2006/relationships" xmlns:p="http://schemas.openxmlformats.org/presentationml/2006/main" show="0">
+  <p:cSld>
+    <p:spTree>
+      <p:nvGrpSpPr>
+        <p:cNvPr id="1" name=""/>
+        <p:cNvGrpSpPr/>
+        <p:nvPr/>
+      </p:nvGrpSpPr>
+      <p:grpSpPr>
+        <a:xfrm>
+          <a:off x="0" y="0"/>
+          <a:ext cx="0" cy="0"/>
+          <a:chOff x="0" y="0"/>
+          <a:chExt cx="0" cy="0"/>
+        </a:xfrm>
+      </p:grpSpPr>
+      <p:sp>
+        <p:nvSpPr>
+          <p:cNvPr id="2" name="Title 1"/>
+          <p:cNvSpPr>
+            <a:spLocks noGrp="1"/>
+          </p:cNvSpPr>
+          <p:nvPr>
+            <p:ph type="title"/>
+          </p:nvPr>
+        </p:nvSpPr>
         <p:spPr>
           <a:xfrm>
             <a:off x="520701" y="228601"/>
@@ -14565,7 +14840,7 @@
 </p:sld>
 </file>
 
-<file path=ppt/slides/slide7.xml><?xml version="1.0" encoding="utf-8"?>
+<file path=ppt/slides/slide8.xml><?xml version="1.0" encoding="utf-8"?>
 <p:sld xmlns:a="http://schemas.openxmlformats.org/drawingml/2006/main" xmlns:r="http://schemas.openxmlformats.org/officeDocument/2006/relationships" xmlns:p="http://schemas.openxmlformats.org/presentationml/2006/main">
   <p:cSld>
     <p:spTree>
@@ -14629,7 +14904,7 @@
 </p:sld>
 </file>
 
-<file path=ppt/slides/slide8.xml><?xml version="1.0" encoding="utf-8"?>
+<file path=ppt/slides/slide9.xml><?xml version="1.0" encoding="utf-8"?>
 <p:sld xmlns:a="http://schemas.openxmlformats.org/drawingml/2006/main" xmlns:r="http://schemas.openxmlformats.org/officeDocument/2006/relationships" xmlns:p="http://schemas.openxmlformats.org/presentationml/2006/main">
   <p:cSld>
     <p:spTree>
@@ -14718,114 +14993,6 @@
     <p:extLst>
       <p:ext uri="{BB962C8B-B14F-4D97-AF65-F5344CB8AC3E}">
         <p14:creationId xmlns:p14="http://schemas.microsoft.com/office/powerpoint/2010/main" val="3451611579"/>
-      </p:ext>
-    </p:extLst>
-  </p:cSld>
-  <p:clrMapOvr>
-    <a:masterClrMapping/>
-  </p:clrMapOvr>
-  <p:transition>
-    <p:fade/>
-  </p:transition>
-  <p:timing>
-    <p:tnLst>
-      <p:par>
-        <p:cTn id="1" dur="indefinite" restart="never" nodeType="tmRoot"/>
-      </p:par>
-    </p:tnLst>
-  </p:timing>
-</p:sld>
-</file>
-
-<file path=ppt/slides/slide9.xml><?xml version="1.0" encoding="utf-8"?>
-<p:sld xmlns:a="http://schemas.openxmlformats.org/drawingml/2006/main" xmlns:r="http://schemas.openxmlformats.org/officeDocument/2006/relationships" xmlns:p="http://schemas.openxmlformats.org/presentationml/2006/main">
-  <p:cSld>
-    <p:spTree>
-      <p:nvGrpSpPr>
-        <p:cNvPr id="1" name=""/>
-        <p:cNvGrpSpPr/>
-        <p:nvPr/>
-      </p:nvGrpSpPr>
-      <p:grpSpPr>
-        <a:xfrm>
-          <a:off x="0" y="0"/>
-          <a:ext cx="0" cy="0"/>
-          <a:chOff x="0" y="0"/>
-          <a:chExt cx="0" cy="0"/>
-        </a:xfrm>
-      </p:grpSpPr>
-      <p:sp>
-        <p:nvSpPr>
-          <p:cNvPr id="5" name="Oval 4"/>
-          <p:cNvSpPr/>
-          <p:nvPr/>
-        </p:nvSpPr>
-        <p:spPr>
-          <a:xfrm>
-            <a:off x="8380614" y="2752725"/>
-            <a:ext cx="2068312" cy="433364"/>
-          </a:xfrm>
-          <a:prstGeom prst="ellipse">
-            <a:avLst/>
-          </a:prstGeom>
-          <a:noFill/>
-          <a:ln w="38100">
-            <a:solidFill>
-              <a:srgbClr val="C00000"/>
-            </a:solidFill>
-          </a:ln>
-        </p:spPr>
-        <p:style>
-          <a:lnRef idx="2">
-            <a:schemeClr val="accent2"/>
-          </a:lnRef>
-          <a:fillRef idx="1">
-            <a:schemeClr val="lt1"/>
-          </a:fillRef>
-          <a:effectRef idx="0">
-            <a:schemeClr val="accent2"/>
-          </a:effectRef>
-          <a:fontRef idx="minor">
-            <a:schemeClr val="dk1"/>
-          </a:fontRef>
-        </p:style>
-        <p:txBody>
-          <a:bodyPr rtlCol="0" anchor="ctr"/>
-          <a:lstStyle/>
-          <a:p>
-            <a:pPr algn="ctr"/>
-            <a:endParaRPr lang="en-US"/>
-          </a:p>
-        </p:txBody>
-      </p:sp>
-      <p:pic>
-        <p:nvPicPr>
-          <p:cNvPr id="4" name="图片 3"/>
-          <p:cNvPicPr>
-            <a:picLocks noChangeAspect="1"/>
-          </p:cNvPicPr>
-          <p:nvPr/>
-        </p:nvPicPr>
-        <p:blipFill>
-          <a:blip r:embed="rId3"/>
-          <a:stretch>
-            <a:fillRect/>
-          </a:stretch>
-        </p:blipFill>
-        <p:spPr>
-          <a:xfrm>
-            <a:off x="1619250" y="395287"/>
-            <a:ext cx="8953500" cy="6067425"/>
-          </a:xfrm>
-          <a:prstGeom prst="rect">
-            <a:avLst/>
-          </a:prstGeom>
-        </p:spPr>
-      </p:pic>
-    </p:spTree>
-    <p:extLst>
-      <p:ext uri="{BB962C8B-B14F-4D97-AF65-F5344CB8AC3E}">
-        <p14:creationId xmlns:p14="http://schemas.microsoft.com/office/powerpoint/2010/main" val="2120446934"/>
       </p:ext>
     </p:extLst>
   </p:cSld>

</xml_diff>